<commit_message>
added slide iluminating sensor dari kakak
</commit_message>
<xml_diff>
--- a/Week3-1 Raspberry.pptx
+++ b/Week3-1 Raspberry.pptx
@@ -229,7 +229,7 @@
           <a:p>
             <a:fld id="{FC7FC171-92E4-4BCB-A93D-F12D7F36229F}" type="datetimeFigureOut">
               <a:rPr lang="ko-KR" altLang="en-US" smtClean="0"/>
-              <a:t>2016-09-20</a:t>
+              <a:t>2016-09-26</a:t>
             </a:fld>
             <a:endParaRPr lang="ko-KR" altLang="en-US"/>
           </a:p>
@@ -497,6 +497,98 @@
 </p:notesMaster>
 </file>
 
+<file path=ppt/notesSlides/notesSlide1.xml><?xml version="1.0" encoding="utf-8"?>
+<p:notes xmlns:a="http://schemas.openxmlformats.org/drawingml/2006/main" xmlns:r="http://schemas.openxmlformats.org/officeDocument/2006/relationships" xmlns:p="http://schemas.openxmlformats.org/presentationml/2006/main">
+  <p:cSld>
+    <p:spTree>
+      <p:nvGrpSpPr>
+        <p:cNvPr id="1" name=""/>
+        <p:cNvGrpSpPr/>
+        <p:nvPr/>
+      </p:nvGrpSpPr>
+      <p:grpSpPr>
+        <a:xfrm>
+          <a:off x="0" y="0"/>
+          <a:ext cx="0" cy="0"/>
+          <a:chOff x="0" y="0"/>
+          <a:chExt cx="0" cy="0"/>
+        </a:xfrm>
+      </p:grpSpPr>
+      <p:sp>
+        <p:nvSpPr>
+          <p:cNvPr id="2" name="Slide Image Placeholder 1"/>
+          <p:cNvSpPr>
+            <a:spLocks noGrp="1" noRot="1" noChangeAspect="1"/>
+          </p:cNvSpPr>
+          <p:nvPr>
+            <p:ph type="sldImg"/>
+          </p:nvPr>
+        </p:nvSpPr>
+        <p:spPr/>
+      </p:sp>
+      <p:sp>
+        <p:nvSpPr>
+          <p:cNvPr id="3" name="Notes Placeholder 2"/>
+          <p:cNvSpPr>
+            <a:spLocks noGrp="1"/>
+          </p:cNvSpPr>
+          <p:nvPr>
+            <p:ph type="body" idx="1"/>
+          </p:nvPr>
+        </p:nvSpPr>
+        <p:spPr/>
+        <p:txBody>
+          <a:bodyPr/>
+          <a:lstStyle/>
+          <a:p>
+            <a:r>
+              <a:rPr lang="en-US" altLang="ko-KR" dirty="0" smtClean="0"/>
+              <a:t>RASPBIAN</a:t>
+            </a:r>
+            <a:r>
+              <a:rPr lang="en-US" altLang="ko-KR" baseline="0" dirty="0" smtClean="0"/>
+              <a:t> KITA 192.168.2.2</a:t>
+            </a:r>
+            <a:endParaRPr lang="ko-KR" altLang="en-US" dirty="0"/>
+          </a:p>
+        </p:txBody>
+      </p:sp>
+      <p:sp>
+        <p:nvSpPr>
+          <p:cNvPr id="4" name="Slide Number Placeholder 3"/>
+          <p:cNvSpPr>
+            <a:spLocks noGrp="1"/>
+          </p:cNvSpPr>
+          <p:nvPr>
+            <p:ph type="sldNum" sz="quarter" idx="10"/>
+          </p:nvPr>
+        </p:nvSpPr>
+        <p:spPr/>
+        <p:txBody>
+          <a:bodyPr/>
+          <a:lstStyle/>
+          <a:p>
+            <a:fld id="{A260C6D3-42C2-4BEE-A325-CC9453E2E5B3}" type="slidenum">
+              <a:rPr lang="ko-KR" altLang="en-US" smtClean="0"/>
+              <a:t>20</a:t>
+            </a:fld>
+            <a:endParaRPr lang="ko-KR" altLang="en-US"/>
+          </a:p>
+        </p:txBody>
+      </p:sp>
+    </p:spTree>
+    <p:extLst>
+      <p:ext uri="{BB962C8B-B14F-4D97-AF65-F5344CB8AC3E}">
+        <p14:creationId xmlns:p14="http://schemas.microsoft.com/office/powerpoint/2010/main" val="919851897"/>
+      </p:ext>
+    </p:extLst>
+  </p:cSld>
+  <p:clrMapOvr>
+    <a:masterClrMapping/>
+  </p:clrMapOvr>
+</p:notes>
+</file>
+
 <file path=ppt/slideLayouts/slideLayout1.xml><?xml version="1.0" encoding="utf-8"?>
 <p:sldLayout xmlns:a="http://schemas.openxmlformats.org/drawingml/2006/main" xmlns:r="http://schemas.openxmlformats.org/officeDocument/2006/relationships" xmlns:p="http://schemas.openxmlformats.org/presentationml/2006/main" type="title" preserve="1">
   <p:cSld name="제목 슬라이드">
@@ -755,7 +847,7 @@
           <a:p>
             <a:fld id="{C31391B9-4FBD-4709-8429-950785178E4C}" type="datetime1">
               <a:rPr lang="ko-KR" altLang="en-US" smtClean="0"/>
-              <a:t>2016-09-20</a:t>
+              <a:t>2016-09-26</a:t>
             </a:fld>
             <a:endParaRPr lang="ko-KR" altLang="en-US" dirty="0"/>
           </a:p>
@@ -966,7 +1058,7 @@
           <a:p>
             <a:fld id="{99B03AD2-E26D-4A33-8719-05CDBE024023}" type="datetime1">
               <a:rPr lang="ko-KR" altLang="en-US" smtClean="0"/>
-              <a:t>2016-09-20</a:t>
+              <a:t>2016-09-26</a:t>
             </a:fld>
             <a:endParaRPr lang="ko-KR" altLang="en-US" dirty="0"/>
           </a:p>
@@ -1171,7 +1263,7 @@
           <a:p>
             <a:fld id="{667DED00-79E9-4A7C-AC94-49242A7F89C4}" type="datetime1">
               <a:rPr lang="ko-KR" altLang="en-US" smtClean="0"/>
-              <a:t>2016-09-20</a:t>
+              <a:t>2016-09-26</a:t>
             </a:fld>
             <a:endParaRPr lang="ko-KR" altLang="en-US" dirty="0"/>
           </a:p>
@@ -1299,7 +1391,7 @@
           <a:p>
             <a:fld id="{32F2DD21-A0BD-4AD8-A2FB-529BEDE11F68}" type="datetime1">
               <a:rPr lang="ko-KR" altLang="en-US" smtClean="0"/>
-              <a:t>2016-09-20</a:t>
+              <a:t>2016-09-26</a:t>
             </a:fld>
             <a:endParaRPr lang="ko-KR" altLang="en-US" dirty="0"/>
           </a:p>
@@ -1572,7 +1664,7 @@
           <a:p>
             <a:fld id="{BCAF64AB-B6E0-4A16-A9FC-3FC6DFE2CC13}" type="datetime1">
               <a:rPr lang="ko-KR" altLang="en-US" smtClean="0"/>
-              <a:t>2016-09-20</a:t>
+              <a:t>2016-09-26</a:t>
             </a:fld>
             <a:endParaRPr lang="ko-KR" altLang="en-US" dirty="0"/>
           </a:p>
@@ -1825,7 +1917,7 @@
           <a:p>
             <a:fld id="{80B0413D-78E5-4449-A7C0-54B474014E5D}" type="datetime1">
               <a:rPr lang="ko-KR" altLang="en-US" smtClean="0"/>
-              <a:t>2016-09-20</a:t>
+              <a:t>2016-09-26</a:t>
             </a:fld>
             <a:endParaRPr lang="ko-KR" altLang="en-US" dirty="0"/>
           </a:p>
@@ -2007,7 +2099,7 @@
           <a:p>
             <a:fld id="{F82343B6-1678-49D0-A189-23A5EBD22C17}" type="datetime1">
               <a:rPr lang="ko-KR" altLang="en-US" smtClean="0"/>
-              <a:t>2016-09-20</a:t>
+              <a:t>2016-09-26</a:t>
             </a:fld>
             <a:endParaRPr lang="ko-KR" altLang="en-US" dirty="0"/>
           </a:p>
@@ -2237,7 +2329,7 @@
           <a:p>
             <a:fld id="{D4ADD467-C8C6-4F8B-A0CB-1F47A93C1655}" type="datetime1">
               <a:rPr lang="ko-KR" altLang="en-US" smtClean="0"/>
-              <a:t>2016-09-20</a:t>
+              <a:t>2016-09-26</a:t>
             </a:fld>
             <a:endParaRPr lang="ko-KR" altLang="en-US" dirty="0"/>
           </a:p>
@@ -2491,7 +2583,7 @@
           <a:p>
             <a:fld id="{A881DA0A-D283-43DF-8752-4CA007BF423F}" type="datetime1">
               <a:rPr lang="ko-KR" altLang="en-US" smtClean="0"/>
-              <a:t>2016-09-20</a:t>
+              <a:t>2016-09-26</a:t>
             </a:fld>
             <a:endParaRPr lang="ko-KR" altLang="en-US" dirty="0"/>
           </a:p>
@@ -2854,7 +2946,7 @@
           <a:p>
             <a:fld id="{95B62A26-C396-495F-A844-8802C4813B16}" type="datetime1">
               <a:rPr lang="ko-KR" altLang="en-US" smtClean="0"/>
-              <a:t>2016-09-20</a:t>
+              <a:t>2016-09-26</a:t>
             </a:fld>
             <a:endParaRPr lang="ko-KR" altLang="en-US" dirty="0"/>
           </a:p>
@@ -3081,7 +3173,7 @@
           <a:p>
             <a:fld id="{3E34E751-3A87-415E-AC39-320D443E05A7}" type="datetime1">
               <a:rPr lang="ko-KR" altLang="en-US" smtClean="0"/>
-              <a:t>2016-09-20</a:t>
+              <a:t>2016-09-26</a:t>
             </a:fld>
             <a:endParaRPr lang="ko-KR" altLang="en-US" dirty="0"/>
           </a:p>
@@ -3386,7 +3478,7 @@
           <a:p>
             <a:fld id="{EC148A29-2C23-4A45-BF3F-58A37D99A581}" type="datetime1">
               <a:rPr lang="ko-KR" altLang="en-US" smtClean="0"/>
-              <a:t>2016-09-20</a:t>
+              <a:t>2016-09-26</a:t>
             </a:fld>
             <a:endParaRPr lang="ko-KR" altLang="en-US" dirty="0"/>
           </a:p>
@@ -3637,7 +3729,7 @@
           <a:p>
             <a:fld id="{53CD30B2-80E1-43DE-AF1C-146F115597AA}" type="datetime1">
               <a:rPr lang="ko-KR" altLang="en-US" smtClean="0"/>
-              <a:t>2016-09-20</a:t>
+              <a:t>2016-09-26</a:t>
             </a:fld>
             <a:endParaRPr lang="ko-KR" altLang="en-US" dirty="0"/>
           </a:p>
@@ -4188,7 +4280,7 @@
           <a:p>
             <a:fld id="{209C89E7-15FE-4BC3-880A-73B29EC32CB9}" type="datetime1">
               <a:rPr lang="ko-KR" altLang="en-US" smtClean="0"/>
-              <a:t>2016-09-20</a:t>
+              <a:t>2016-09-26</a:t>
             </a:fld>
             <a:endParaRPr lang="ko-KR" altLang="en-US" dirty="0"/>
           </a:p>
@@ -4644,7 +4736,7 @@
           <a:p>
             <a:fld id="{04D8DD28-8A11-4029-A0DA-38FE6F7E0E0F}" type="datetime1">
               <a:rPr lang="ko-KR" altLang="en-US" smtClean="0"/>
-              <a:t>2016-09-20</a:t>
+              <a:t>2016-09-26</a:t>
             </a:fld>
             <a:endParaRPr lang="ko-KR" altLang="en-US" dirty="0"/>
           </a:p>
@@ -4796,7 +4888,7 @@
           <a:p>
             <a:fld id="{7EC852CB-A3BD-4CC5-B032-E934B5A1C878}" type="datetime1">
               <a:rPr lang="ko-KR" altLang="en-US" smtClean="0"/>
-              <a:t>2016-09-20</a:t>
+              <a:t>2016-09-26</a:t>
             </a:fld>
             <a:endParaRPr lang="ko-KR" altLang="en-US" dirty="0"/>
           </a:p>
@@ -5072,7 +5164,7 @@
           <a:p>
             <a:fld id="{92E90DED-1A97-41E6-B148-00022D2FDB3B}" type="datetime1">
               <a:rPr lang="ko-KR" altLang="en-US" smtClean="0"/>
-              <a:t>2016-09-20</a:t>
+              <a:t>2016-09-26</a:t>
             </a:fld>
             <a:endParaRPr lang="ko-KR" altLang="en-US" dirty="0"/>
           </a:p>
@@ -5532,15 +5624,7 @@
                   <a:srgbClr val="C00000"/>
                 </a:solidFill>
               </a:rPr>
-              <a:t>Raspberry </a:t>
-            </a:r>
-            <a:r>
-              <a:rPr lang="en-US" altLang="ko-KR" dirty="0" smtClean="0">
-                <a:solidFill>
-                  <a:srgbClr val="C00000"/>
-                </a:solidFill>
-              </a:rPr>
-              <a:t>Pi</a:t>
+              <a:t>Raspberry Pi</a:t>
             </a:r>
             <a:br>
               <a:rPr lang="en-US" altLang="ko-KR" dirty="0" smtClean="0">
@@ -8278,7 +8362,7 @@
           <p:nvPr/>
         </p:nvPicPr>
         <p:blipFill>
-          <a:blip r:embed="rId2">
+          <a:blip r:embed="rId3">
             <a:extLst>
               <a:ext uri="{28A0092B-C50C-407E-A947-70E740481C1C}">
                 <a14:useLocalDpi xmlns:a14="http://schemas.microsoft.com/office/drawing/2010/main" val="0"/>
@@ -8308,7 +8392,7 @@
           <p:nvPr/>
         </p:nvPicPr>
         <p:blipFill>
-          <a:blip r:embed="rId3" cstate="print">
+          <a:blip r:embed="rId4" cstate="print">
             <a:extLst>
               <a:ext uri="{28A0092B-C50C-407E-A947-70E740481C1C}">
                 <a14:useLocalDpi xmlns:a14="http://schemas.microsoft.com/office/drawing/2010/main" val="0"/>
@@ -8977,9 +9061,27 @@
                 <a:tableStyleId>{5C22544A-7EE6-4342-B048-85BDC9FD1C3A}</a:tableStyleId>
               </a:tblPr>
               <a:tblGrid>
-                <a:gridCol w="1230288"/>
-                <a:gridCol w="1303362"/>
-                <a:gridCol w="1409700"/>
+                <a:gridCol w="1230288">
+                  <a:extLst>
+                    <a:ext uri="{9D8B030D-6E8A-4147-A177-3AD203B41FA5}">
+                      <a16:colId xmlns:a16="http://schemas.microsoft.com/office/drawing/2014/main" val="20000"/>
+                    </a:ext>
+                  </a:extLst>
+                </a:gridCol>
+                <a:gridCol w="1303362">
+                  <a:extLst>
+                    <a:ext uri="{9D8B030D-6E8A-4147-A177-3AD203B41FA5}">
+                      <a16:colId xmlns:a16="http://schemas.microsoft.com/office/drawing/2014/main" val="20001"/>
+                    </a:ext>
+                  </a:extLst>
+                </a:gridCol>
+                <a:gridCol w="1409700">
+                  <a:extLst>
+                    <a:ext uri="{9D8B030D-6E8A-4147-A177-3AD203B41FA5}">
+                      <a16:colId xmlns:a16="http://schemas.microsoft.com/office/drawing/2014/main" val="20002"/>
+                    </a:ext>
+                  </a:extLst>
+                </a:gridCol>
               </a:tblGrid>
               <a:tr h="367904">
                 <a:tc>
@@ -9023,6 +9125,11 @@
                   </a:txBody>
                   <a:tcPr marL="68580" marR="68580" marT="34290" marB="34290"/>
                 </a:tc>
+                <a:extLst>
+                  <a:ext uri="{0D108BD9-81ED-4DB2-BD59-A6C34878D82A}">
+                    <a16:rowId xmlns:a16="http://schemas.microsoft.com/office/drawing/2014/main" val="10000"/>
+                  </a:ext>
+                </a:extLst>
               </a:tr>
               <a:tr h="367904">
                 <a:tc>
@@ -9074,6 +9181,11 @@
                   </a:txBody>
                   <a:tcPr marL="68580" marR="68580" marT="34290" marB="34290" anchor="ctr"/>
                 </a:tc>
+                <a:extLst>
+                  <a:ext uri="{0D108BD9-81ED-4DB2-BD59-A6C34878D82A}">
+                    <a16:rowId xmlns:a16="http://schemas.microsoft.com/office/drawing/2014/main" val="10001"/>
+                  </a:ext>
+                </a:extLst>
               </a:tr>
               <a:tr h="480060">
                 <a:tc>
@@ -9140,6 +9252,11 @@
                   </a:txBody>
                   <a:tcPr marL="68580" marR="68580" marT="34290" marB="34290" anchor="ctr"/>
                 </a:tc>
+                <a:extLst>
+                  <a:ext uri="{0D108BD9-81ED-4DB2-BD59-A6C34878D82A}">
+                    <a16:rowId xmlns:a16="http://schemas.microsoft.com/office/drawing/2014/main" val="10002"/>
+                  </a:ext>
+                </a:extLst>
               </a:tr>
               <a:tr h="480060">
                 <a:tc>
@@ -9194,6 +9311,11 @@
                   </a:txBody>
                   <a:tcPr marL="68580" marR="68580" marT="34290" marB="34290" anchor="ctr"/>
                 </a:tc>
+                <a:extLst>
+                  <a:ext uri="{0D108BD9-81ED-4DB2-BD59-A6C34878D82A}">
+                    <a16:rowId xmlns:a16="http://schemas.microsoft.com/office/drawing/2014/main" val="10003"/>
+                  </a:ext>
+                </a:extLst>
               </a:tr>
               <a:tr h="685800">
                 <a:tc>
@@ -9241,6 +9363,11 @@
                   </a:txBody>
                   <a:tcPr marL="68580" marR="68580" marT="34290" marB="34290" anchor="ctr"/>
                 </a:tc>
+                <a:extLst>
+                  <a:ext uri="{0D108BD9-81ED-4DB2-BD59-A6C34878D82A}">
+                    <a16:rowId xmlns:a16="http://schemas.microsoft.com/office/drawing/2014/main" val="10004"/>
+                  </a:ext>
+                </a:extLst>
               </a:tr>
             </a:tbl>
           </a:graphicData>

</xml_diff>